<commit_message>
oprava překlepu v tabulce
</commit_message>
<xml_diff>
--- a/02-vyhledavani-data/cviceni-02.pptx
+++ b/02-vyhledavani-data/cviceni-02.pptx
@@ -228,7 +228,7 @@
           <a:p>
             <a:fld id="{AD5CED4F-6B49-49DE-B955-E0CB6CE438C9}" type="datetimeFigureOut">
               <a:rPr lang="cs-CZ" smtClean="0"/>
-              <a:t>17.02.2021</a:t>
+              <a:t>25.02.2021</a:t>
             </a:fld>
             <a:endParaRPr lang="cs-CZ"/>
           </a:p>
@@ -1307,7 +1307,7 @@
             <a:fld id="{5586B75A-687E-405C-8A0B-8D00578BA2C3}" type="datetimeFigureOut">
               <a:rPr lang="en-US" smtClean="0"/>
               <a:pPr/>
-              <a:t>2/17/2021</a:t>
+              <a:t>2/25/2021</a:t>
             </a:fld>
             <a:endParaRPr lang="en-US" dirty="0"/>
           </a:p>
@@ -1560,7 +1560,7 @@
             <a:fld id="{5586B75A-687E-405C-8A0B-8D00578BA2C3}" type="datetimeFigureOut">
               <a:rPr lang="en-US" smtClean="0"/>
               <a:pPr/>
-              <a:t>2/17/2021</a:t>
+              <a:t>2/25/2021</a:t>
             </a:fld>
             <a:endParaRPr lang="en-US" dirty="0"/>
           </a:p>
@@ -1877,7 +1877,7 @@
             <a:fld id="{5586B75A-687E-405C-8A0B-8D00578BA2C3}" type="datetimeFigureOut">
               <a:rPr lang="en-US" smtClean="0"/>
               <a:pPr/>
-              <a:t>2/17/2021</a:t>
+              <a:t>2/25/2021</a:t>
             </a:fld>
             <a:endParaRPr lang="en-US" dirty="0"/>
           </a:p>
@@ -2207,7 +2207,7 @@
             <a:fld id="{5586B75A-687E-405C-8A0B-8D00578BA2C3}" type="datetimeFigureOut">
               <a:rPr lang="en-US" smtClean="0"/>
               <a:pPr/>
-              <a:t>2/17/2021</a:t>
+              <a:t>2/25/2021</a:t>
             </a:fld>
             <a:endParaRPr lang="en-US" dirty="0"/>
           </a:p>
@@ -2524,7 +2524,7 @@
             <a:fld id="{5586B75A-687E-405C-8A0B-8D00578BA2C3}" type="datetimeFigureOut">
               <a:rPr lang="en-US" smtClean="0"/>
               <a:pPr/>
-              <a:t>2/17/2021</a:t>
+              <a:t>2/25/2021</a:t>
             </a:fld>
             <a:endParaRPr lang="en-US" dirty="0"/>
           </a:p>
@@ -2914,7 +2914,7 @@
             <a:fld id="{5586B75A-687E-405C-8A0B-8D00578BA2C3}" type="datetimeFigureOut">
               <a:rPr lang="en-US" smtClean="0"/>
               <a:pPr/>
-              <a:t>2/17/2021</a:t>
+              <a:t>2/25/2021</a:t>
             </a:fld>
             <a:endParaRPr lang="en-US" dirty="0"/>
           </a:p>
@@ -3086,7 +3086,7 @@
           <a:p>
             <a:fld id="{5F4E5243-F52A-4D37-9694-EB26C6C31910}" type="datetimeFigureOut">
               <a:rPr lang="en-US" smtClean="0"/>
-              <a:t>2/17/2021</a:t>
+              <a:t>2/25/2021</a:t>
             </a:fld>
             <a:endParaRPr lang="en-US" dirty="0"/>
           </a:p>
@@ -3266,7 +3266,7 @@
           <a:p>
             <a:fld id="{3A77B6E1-634A-48DC-9E8B-D894023267EF}" type="datetimeFigureOut">
               <a:rPr lang="en-US" smtClean="0"/>
-              <a:t>2/17/2021</a:t>
+              <a:t>2/25/2021</a:t>
             </a:fld>
             <a:endParaRPr lang="en-US" dirty="0"/>
           </a:p>
@@ -3442,7 +3442,7 @@
           <a:p>
             <a:fld id="{7B2D3E9E-A95C-48F2-B4BF-A71542E0BE9A}" type="datetimeFigureOut">
               <a:rPr lang="en-US" smtClean="0"/>
-              <a:t>2/17/2021</a:t>
+              <a:t>2/25/2021</a:t>
             </a:fld>
             <a:endParaRPr lang="en-US" dirty="0"/>
           </a:p>
@@ -3690,7 +3690,7 @@
             <a:fld id="{5586B75A-687E-405C-8A0B-8D00578BA2C3}" type="datetimeFigureOut">
               <a:rPr lang="en-US" smtClean="0"/>
               <a:pPr/>
-              <a:t>2/17/2021</a:t>
+              <a:t>2/25/2021</a:t>
             </a:fld>
             <a:endParaRPr lang="en-US" dirty="0"/>
           </a:p>
@@ -3923,7 +3923,7 @@
           <a:p>
             <a:fld id="{F12952B5-7A2F-4CC8-B7CE-9234E21C2837}" type="datetimeFigureOut">
               <a:rPr lang="en-US" smtClean="0"/>
-              <a:t>2/17/2021</a:t>
+              <a:t>2/25/2021</a:t>
             </a:fld>
             <a:endParaRPr lang="en-US" dirty="0"/>
           </a:p>
@@ -4297,7 +4297,7 @@
           <a:p>
             <a:fld id="{CE1DA07A-9201-4B4B-BAF2-015AFA30F520}" type="datetimeFigureOut">
               <a:rPr lang="en-US" smtClean="0"/>
-              <a:t>2/17/2021</a:t>
+              <a:t>2/25/2021</a:t>
             </a:fld>
             <a:endParaRPr lang="en-US" dirty="0"/>
           </a:p>
@@ -4420,7 +4420,7 @@
           <a:p>
             <a:fld id="{73D7E00A-486F-4252-8B1D-E32645521F49}" type="datetimeFigureOut">
               <a:rPr lang="en-US" smtClean="0"/>
-              <a:t>2/17/2021</a:t>
+              <a:t>2/25/2021</a:t>
             </a:fld>
             <a:endParaRPr lang="en-US" dirty="0"/>
           </a:p>
@@ -4515,7 +4515,7 @@
           <a:p>
             <a:fld id="{8DDF5F92-E675-4B36-9A60-69A962A68675}" type="datetimeFigureOut">
               <a:rPr lang="en-US" smtClean="0"/>
-              <a:t>2/17/2021</a:t>
+              <a:t>2/25/2021</a:t>
             </a:fld>
             <a:endParaRPr lang="en-US" dirty="0"/>
           </a:p>
@@ -4770,7 +4770,7 @@
           <a:p>
             <a:fld id="{AF6E2C9B-5FA2-460D-9BE7-B0812FC2A6FF}" type="datetimeFigureOut">
               <a:rPr lang="en-US" smtClean="0"/>
-              <a:t>2/17/2021</a:t>
+              <a:t>2/25/2021</a:t>
             </a:fld>
             <a:endParaRPr lang="en-US" dirty="0"/>
           </a:p>
@@ -5035,7 +5035,7 @@
             <a:fld id="{5586B75A-687E-405C-8A0B-8D00578BA2C3}" type="datetimeFigureOut">
               <a:rPr lang="en-US" smtClean="0"/>
               <a:pPr/>
-              <a:t>2/17/2021</a:t>
+              <a:t>2/25/2021</a:t>
             </a:fld>
             <a:endParaRPr lang="en-US" dirty="0"/>
           </a:p>
@@ -5782,7 +5782,7 @@
             <a:fld id="{5586B75A-687E-405C-8A0B-8D00578BA2C3}" type="datetimeFigureOut">
               <a:rPr lang="en-US" smtClean="0"/>
               <a:pPr/>
-              <a:t>2/17/2021</a:t>
+              <a:t>2/25/2021</a:t>
             </a:fld>
             <a:endParaRPr lang="en-US" dirty="0"/>
           </a:p>
@@ -7212,7 +7212,7 @@
           <p:nvPr>
             <p:extLst>
               <p:ext uri="{D42A27DB-BD31-4B8C-83A1-F6EECF244321}">
-                <p14:modId xmlns:p14="http://schemas.microsoft.com/office/powerpoint/2010/main" val="1745886471"/>
+                <p14:modId xmlns:p14="http://schemas.microsoft.com/office/powerpoint/2010/main" val="2311165646"/>
               </p:ext>
             </p:extLst>
           </p:nvPr>
@@ -7372,9 +7372,10 @@
                     <a:lstStyle/>
                     <a:p>
                       <a:r>
-                        <a:rPr lang="cs-CZ" dirty="0"/>
-                        <a:t>c</a:t>
+                        <a:rPr lang="en-US" dirty="0"/>
+                        <a:t>d</a:t>
                       </a:r>
+                      <a:endParaRPr lang="cs-CZ" dirty="0"/>
                     </a:p>
                   </a:txBody>
                   <a:tcPr/>

</xml_diff>